<commit_message>
oop/classes and objects: tweak text
</commit_message>
<xml_diff>
--- a/diagrams/uml/classDiagrams/classes/classes.pptx
+++ b/diagrams/uml/classDiagrams/classes/classes.pptx
@@ -104,6 +104,22 @@
       </a:defRPr>
     </a:lvl9pPr>
   </p:defaultTextStyle>
+  <p:extLst>
+    <p:ext uri="{EFAFB233-063F-42B5-8137-9DF3F51BA10A}">
+      <p15:sldGuideLst xmlns:p15="http://schemas.microsoft.com/office/powerpoint/2012/main">
+        <p15:guide id="1" orient="horz" pos="2160">
+          <p15:clr>
+            <a:srgbClr val="A4A3A4"/>
+          </p15:clr>
+        </p15:guide>
+        <p15:guide id="2" pos="2880">
+          <p15:clr>
+            <a:srgbClr val="A4A3A4"/>
+          </p15:clr>
+        </p15:guide>
+      </p15:sldGuideLst>
+    </p:ext>
+  </p:extLst>
 </p:presentation>
 </file>
 
@@ -288,7 +304,7 @@
           <a:p>
             <a:fld id="{A0F86979-30DA-49EE-A740-32EBA6D2B7DE}" type="datetimeFigureOut">
               <a:rPr lang="en-SG" smtClean="0"/>
-              <a:t>2/6/2017</a:t>
+              <a:t>29/8/2017</a:t>
             </a:fld>
             <a:endParaRPr lang="en-SG"/>
           </a:p>
@@ -458,7 +474,7 @@
           <a:p>
             <a:fld id="{A0F86979-30DA-49EE-A740-32EBA6D2B7DE}" type="datetimeFigureOut">
               <a:rPr lang="en-SG" smtClean="0"/>
-              <a:t>2/6/2017</a:t>
+              <a:t>29/8/2017</a:t>
             </a:fld>
             <a:endParaRPr lang="en-SG"/>
           </a:p>
@@ -638,7 +654,7 @@
           <a:p>
             <a:fld id="{A0F86979-30DA-49EE-A740-32EBA6D2B7DE}" type="datetimeFigureOut">
               <a:rPr lang="en-SG" smtClean="0"/>
-              <a:t>2/6/2017</a:t>
+              <a:t>29/8/2017</a:t>
             </a:fld>
             <a:endParaRPr lang="en-SG"/>
           </a:p>
@@ -808,7 +824,7 @@
           <a:p>
             <a:fld id="{A0F86979-30DA-49EE-A740-32EBA6D2B7DE}" type="datetimeFigureOut">
               <a:rPr lang="en-SG" smtClean="0"/>
-              <a:t>2/6/2017</a:t>
+              <a:t>29/8/2017</a:t>
             </a:fld>
             <a:endParaRPr lang="en-SG"/>
           </a:p>
@@ -1054,7 +1070,7 @@
           <a:p>
             <a:fld id="{A0F86979-30DA-49EE-A740-32EBA6D2B7DE}" type="datetimeFigureOut">
               <a:rPr lang="en-SG" smtClean="0"/>
-              <a:t>2/6/2017</a:t>
+              <a:t>29/8/2017</a:t>
             </a:fld>
             <a:endParaRPr lang="en-SG"/>
           </a:p>
@@ -1342,7 +1358,7 @@
           <a:p>
             <a:fld id="{A0F86979-30DA-49EE-A740-32EBA6D2B7DE}" type="datetimeFigureOut">
               <a:rPr lang="en-SG" smtClean="0"/>
-              <a:t>2/6/2017</a:t>
+              <a:t>29/8/2017</a:t>
             </a:fld>
             <a:endParaRPr lang="en-SG"/>
           </a:p>
@@ -1764,7 +1780,7 @@
           <a:p>
             <a:fld id="{A0F86979-30DA-49EE-A740-32EBA6D2B7DE}" type="datetimeFigureOut">
               <a:rPr lang="en-SG" smtClean="0"/>
-              <a:t>2/6/2017</a:t>
+              <a:t>29/8/2017</a:t>
             </a:fld>
             <a:endParaRPr lang="en-SG"/>
           </a:p>
@@ -1882,7 +1898,7 @@
           <a:p>
             <a:fld id="{A0F86979-30DA-49EE-A740-32EBA6D2B7DE}" type="datetimeFigureOut">
               <a:rPr lang="en-SG" smtClean="0"/>
-              <a:t>2/6/2017</a:t>
+              <a:t>29/8/2017</a:t>
             </a:fld>
             <a:endParaRPr lang="en-SG"/>
           </a:p>
@@ -1977,7 +1993,7 @@
           <a:p>
             <a:fld id="{A0F86979-30DA-49EE-A740-32EBA6D2B7DE}" type="datetimeFigureOut">
               <a:rPr lang="en-SG" smtClean="0"/>
-              <a:t>2/6/2017</a:t>
+              <a:t>29/8/2017</a:t>
             </a:fld>
             <a:endParaRPr lang="en-SG"/>
           </a:p>
@@ -2254,7 +2270,7 @@
           <a:p>
             <a:fld id="{A0F86979-30DA-49EE-A740-32EBA6D2B7DE}" type="datetimeFigureOut">
               <a:rPr lang="en-SG" smtClean="0"/>
-              <a:t>2/6/2017</a:t>
+              <a:t>29/8/2017</a:t>
             </a:fld>
             <a:endParaRPr lang="en-SG"/>
           </a:p>
@@ -2507,7 +2523,7 @@
           <a:p>
             <a:fld id="{A0F86979-30DA-49EE-A740-32EBA6D2B7DE}" type="datetimeFigureOut">
               <a:rPr lang="en-SG" smtClean="0"/>
-              <a:t>2/6/2017</a:t>
+              <a:t>29/8/2017</a:t>
             </a:fld>
             <a:endParaRPr lang="en-SG"/>
           </a:p>
@@ -2720,7 +2736,7 @@
           <a:p>
             <a:fld id="{A0F86979-30DA-49EE-A740-32EBA6D2B7DE}" type="datetimeFigureOut">
               <a:rPr lang="en-SG" smtClean="0"/>
-              <a:t>2/6/2017</a:t>
+              <a:t>29/8/2017</a:t>
             </a:fld>
             <a:endParaRPr lang="en-SG"/>
           </a:p>
@@ -3500,7 +3516,7 @@
             </a:solidFill>
             <a:ln>
               <a:solidFill>
-                <a:srgbClr val="C00000"/>
+                <a:schemeClr val="tx1"/>
               </a:solidFill>
             </a:ln>
             <a:effectLst/>
@@ -3529,14 +3545,14 @@
               <a:r>
                 <a:rPr lang="en-US" dirty="0" smtClean="0">
                   <a:solidFill>
-                    <a:srgbClr val="FF0000"/>
+                    <a:schemeClr val="tx1"/>
                   </a:solidFill>
                 </a:rPr>
                 <a:t>Class E</a:t>
               </a:r>
               <a:endParaRPr lang="en-US" dirty="0">
                 <a:solidFill>
-                  <a:srgbClr val="FF0000"/>
+                  <a:schemeClr val="tx1"/>
                 </a:solidFill>
               </a:endParaRPr>
             </a:p>
@@ -3561,7 +3577,7 @@
             </a:solidFill>
             <a:ln>
               <a:solidFill>
-                <a:srgbClr val="C00000"/>
+                <a:schemeClr val="tx1"/>
               </a:solidFill>
             </a:ln>
             <a:effectLst/>
@@ -3589,14 +3605,14 @@
               <a:r>
                 <a:rPr lang="en-US" dirty="0" smtClean="0">
                   <a:solidFill>
-                    <a:srgbClr val="FF0000"/>
+                    <a:schemeClr val="tx1"/>
                   </a:solidFill>
                 </a:rPr>
                 <a:t>Operations</a:t>
               </a:r>
               <a:endParaRPr lang="en-US" dirty="0">
                 <a:solidFill>
-                  <a:srgbClr val="FF0000"/>
+                  <a:schemeClr val="tx1"/>
                 </a:solidFill>
               </a:endParaRPr>
             </a:p>
@@ -3853,7 +3869,7 @@
       </p:grpSp>
       <p:grpSp>
         <p:nvGrpSpPr>
-          <p:cNvPr id="178" name="x"/>
+          <p:cNvPr id="45" name="tick"/>
           <p:cNvGrpSpPr>
             <a:grpSpLocks noChangeAspect="1"/>
           </p:cNvGrpSpPr>
@@ -3863,130 +3879,211 @@
           <a:xfrm>
             <a:off x="7429541" y="2699904"/>
             <a:ext cx="361173" cy="361173"/>
-            <a:chOff x="5562600" y="1371600"/>
+            <a:chOff x="6416224" y="914400"/>
             <a:chExt cx="738443" cy="738443"/>
           </a:xfrm>
         </p:grpSpPr>
+        <p:grpSp>
+          <p:nvGrpSpPr>
+            <p:cNvPr id="46" name="Group 45"/>
+            <p:cNvGrpSpPr/>
+            <p:nvPr/>
+          </p:nvGrpSpPr>
+          <p:grpSpPr>
+            <a:xfrm>
+              <a:off x="6416224" y="914400"/>
+              <a:ext cx="738443" cy="738443"/>
+              <a:chOff x="5562600" y="1371600"/>
+              <a:chExt cx="738443" cy="738443"/>
+            </a:xfrm>
+          </p:grpSpPr>
+          <p:sp>
+            <p:nvSpPr>
+              <p:cNvPr id="48" name="Flowchart: Connector 47"/>
+              <p:cNvSpPr/>
+              <p:nvPr/>
+            </p:nvSpPr>
+            <p:spPr>
+              <a:xfrm>
+                <a:off x="5562600" y="1371600"/>
+                <a:ext cx="738443" cy="738443"/>
+              </a:xfrm>
+              <a:prstGeom prst="flowChartConnector">
+                <a:avLst/>
+              </a:prstGeom>
+              <a:solidFill>
+                <a:schemeClr val="bg1"/>
+              </a:solidFill>
+              <a:ln>
+                <a:noFill/>
+              </a:ln>
+            </p:spPr>
+            <p:style>
+              <a:lnRef idx="2">
+                <a:schemeClr val="accent1">
+                  <a:shade val="50000"/>
+                </a:schemeClr>
+              </a:lnRef>
+              <a:fillRef idx="1">
+                <a:schemeClr val="accent1"/>
+              </a:fillRef>
+              <a:effectRef idx="0">
+                <a:schemeClr val="accent1"/>
+              </a:effectRef>
+              <a:fontRef idx="minor">
+                <a:schemeClr val="lt1"/>
+              </a:fontRef>
+            </p:style>
+            <p:txBody>
+              <a:bodyPr rtlCol="0" anchor="ctr"/>
+              <a:lstStyle/>
+              <a:p>
+                <a:pPr algn="ctr"/>
+                <a:endParaRPr lang="en-SG">
+                  <a:solidFill>
+                    <a:schemeClr val="tx1"/>
+                  </a:solidFill>
+                </a:endParaRPr>
+              </a:p>
+            </p:txBody>
+          </p:sp>
+          <p:sp>
+            <p:nvSpPr>
+              <p:cNvPr id="49" name="Donut 48"/>
+              <p:cNvSpPr/>
+              <p:nvPr/>
+            </p:nvSpPr>
+            <p:spPr>
+              <a:xfrm>
+                <a:off x="5562600" y="1371600"/>
+                <a:ext cx="738443" cy="738443"/>
+              </a:xfrm>
+              <a:prstGeom prst="donut">
+                <a:avLst>
+                  <a:gd name="adj" fmla="val 13134"/>
+                </a:avLst>
+              </a:prstGeom>
+              <a:solidFill>
+                <a:srgbClr val="00B050"/>
+              </a:solidFill>
+              <a:ln>
+                <a:noFill/>
+              </a:ln>
+            </p:spPr>
+            <p:style>
+              <a:lnRef idx="2">
+                <a:schemeClr val="accent1">
+                  <a:shade val="50000"/>
+                </a:schemeClr>
+              </a:lnRef>
+              <a:fillRef idx="1">
+                <a:schemeClr val="accent1"/>
+              </a:fillRef>
+              <a:effectRef idx="0">
+                <a:schemeClr val="accent1"/>
+              </a:effectRef>
+              <a:fontRef idx="minor">
+                <a:schemeClr val="lt1"/>
+              </a:fontRef>
+            </p:style>
+            <p:txBody>
+              <a:bodyPr rtlCol="0" anchor="ctr"/>
+              <a:lstStyle/>
+              <a:p>
+                <a:pPr algn="ctr"/>
+                <a:endParaRPr lang="en-SG">
+                  <a:solidFill>
+                    <a:schemeClr val="tx1"/>
+                  </a:solidFill>
+                </a:endParaRPr>
+              </a:p>
+            </p:txBody>
+          </p:sp>
+        </p:grpSp>
         <p:sp>
           <p:nvSpPr>
-            <p:cNvPr id="179" name="Flowchart: Connector 178"/>
+            <p:cNvPr id="47" name="Rounded Rectangle 77"/>
             <p:cNvSpPr/>
             <p:nvPr/>
           </p:nvSpPr>
           <p:spPr>
-            <a:xfrm>
-              <a:off x="5562600" y="1371600"/>
-              <a:ext cx="738443" cy="738443"/>
+            <a:xfrm rot="2587769">
+              <a:off x="6656137" y="1053893"/>
+              <a:ext cx="232543" cy="384698"/>
             </a:xfrm>
-            <a:prstGeom prst="flowChartConnector">
+            <a:custGeom>
               <a:avLst/>
-            </a:prstGeom>
+              <a:gdLst/>
+              <a:ahLst/>
+              <a:cxnLst/>
+              <a:rect l="l" t="t" r="r" b="b"/>
+              <a:pathLst>
+                <a:path w="374514" h="619560">
+                  <a:moveTo>
+                    <a:pt x="223457" y="7753"/>
+                  </a:moveTo>
+                  <a:cubicBezTo>
+                    <a:pt x="228247" y="2963"/>
+                    <a:pt x="234864" y="0"/>
+                    <a:pt x="242174" y="0"/>
+                  </a:cubicBezTo>
+                  <a:lnTo>
+                    <a:pt x="348046" y="0"/>
+                  </a:lnTo>
+                  <a:cubicBezTo>
+                    <a:pt x="362663" y="0"/>
+                    <a:pt x="374515" y="11851"/>
+                    <a:pt x="374514" y="26469"/>
+                  </a:cubicBezTo>
+                  <a:lnTo>
+                    <a:pt x="374514" y="591151"/>
+                  </a:lnTo>
+                  <a:cubicBezTo>
+                    <a:pt x="374514" y="605769"/>
+                    <a:pt x="362663" y="617620"/>
+                    <a:pt x="348046" y="617620"/>
+                  </a:cubicBezTo>
+                  <a:lnTo>
+                    <a:pt x="273165" y="617620"/>
+                  </a:lnTo>
+                  <a:cubicBezTo>
+                    <a:pt x="271846" y="619393"/>
+                    <a:pt x="270184" y="619560"/>
+                    <a:pt x="268482" y="619560"/>
+                  </a:cubicBezTo>
+                  <a:lnTo>
+                    <a:pt x="25401" y="619560"/>
+                  </a:lnTo>
+                  <a:cubicBezTo>
+                    <a:pt x="11372" y="619560"/>
+                    <a:pt x="0" y="608188"/>
+                    <a:pt x="0" y="594159"/>
+                  </a:cubicBezTo>
+                  <a:lnTo>
+                    <a:pt x="0" y="492561"/>
+                  </a:lnTo>
+                  <a:cubicBezTo>
+                    <a:pt x="0" y="478532"/>
+                    <a:pt x="11372" y="467160"/>
+                    <a:pt x="25401" y="467160"/>
+                  </a:cubicBezTo>
+                  <a:lnTo>
+                    <a:pt x="215705" y="467160"/>
+                  </a:lnTo>
+                  <a:lnTo>
+                    <a:pt x="215705" y="26469"/>
+                  </a:lnTo>
+                  <a:cubicBezTo>
+                    <a:pt x="215704" y="19160"/>
+                    <a:pt x="218667" y="12543"/>
+                    <a:pt x="223457" y="7753"/>
+                  </a:cubicBezTo>
+                  <a:close/>
+                </a:path>
+              </a:pathLst>
+            </a:custGeom>
             <a:solidFill>
-              <a:schemeClr val="bg1"/>
-            </a:solidFill>
-            <a:ln>
-              <a:noFill/>
-            </a:ln>
-          </p:spPr>
-          <p:style>
-            <a:lnRef idx="2">
-              <a:schemeClr val="accent1">
-                <a:shade val="50000"/>
-              </a:schemeClr>
-            </a:lnRef>
-            <a:fillRef idx="1">
-              <a:schemeClr val="accent1"/>
-            </a:fillRef>
-            <a:effectRef idx="0">
-              <a:schemeClr val="accent1"/>
-            </a:effectRef>
-            <a:fontRef idx="minor">
-              <a:schemeClr val="lt1"/>
-            </a:fontRef>
-          </p:style>
-          <p:txBody>
-            <a:bodyPr rtlCol="0" anchor="ctr"/>
-            <a:lstStyle/>
-            <a:p>
-              <a:pPr algn="ctr"/>
-              <a:endParaRPr lang="en-SG">
-                <a:solidFill>
-                  <a:schemeClr val="tx1"/>
-                </a:solidFill>
-              </a:endParaRPr>
-            </a:p>
-          </p:txBody>
-        </p:sp>
-        <p:sp>
-          <p:nvSpPr>
-            <p:cNvPr id="180" name="Donut 179"/>
-            <p:cNvSpPr/>
-            <p:nvPr/>
-          </p:nvSpPr>
-          <p:spPr>
-            <a:xfrm>
-              <a:off x="5562600" y="1371600"/>
-              <a:ext cx="738443" cy="738443"/>
-            </a:xfrm>
-            <a:prstGeom prst="donut">
-              <a:avLst>
-                <a:gd name="adj" fmla="val 13134"/>
-              </a:avLst>
-            </a:prstGeom>
-            <a:solidFill>
-              <a:srgbClr val="C00000"/>
-            </a:solidFill>
-            <a:ln>
-              <a:noFill/>
-            </a:ln>
-          </p:spPr>
-          <p:style>
-            <a:lnRef idx="2">
-              <a:schemeClr val="accent1">
-                <a:shade val="50000"/>
-              </a:schemeClr>
-            </a:lnRef>
-            <a:fillRef idx="1">
-              <a:schemeClr val="accent1"/>
-            </a:fillRef>
-            <a:effectRef idx="0">
-              <a:schemeClr val="accent1"/>
-            </a:effectRef>
-            <a:fontRef idx="minor">
-              <a:schemeClr val="lt1"/>
-            </a:fontRef>
-          </p:style>
-          <p:txBody>
-            <a:bodyPr rtlCol="0" anchor="ctr"/>
-            <a:lstStyle/>
-            <a:p>
-              <a:pPr algn="ctr"/>
-              <a:endParaRPr lang="en-SG">
-                <a:solidFill>
-                  <a:schemeClr val="tx1"/>
-                </a:solidFill>
-              </a:endParaRPr>
-            </a:p>
-          </p:txBody>
-        </p:sp>
-        <p:sp>
-          <p:nvSpPr>
-            <p:cNvPr id="181" name="Cross 180"/>
-            <p:cNvSpPr/>
-            <p:nvPr/>
-          </p:nvSpPr>
-          <p:spPr>
-            <a:xfrm rot="2492112">
-              <a:off x="5747417" y="1548369"/>
-              <a:ext cx="368808" cy="368808"/>
-            </a:xfrm>
-            <a:prstGeom prst="plus">
-              <a:avLst>
-                <a:gd name="adj" fmla="val 35417"/>
-              </a:avLst>
-            </a:prstGeom>
-            <a:solidFill>
-              <a:srgbClr val="C00000"/>
+              <a:srgbClr val="00B050"/>
             </a:solidFill>
             <a:ln>
               <a:noFill/>

</xml_diff>

<commit_message>
uml/CD/classes: add some notation errors
</commit_message>
<xml_diff>
--- a/diagrams/uml/classDiagrams/classes/classes.pptx
+++ b/diagrams/uml/classDiagrams/classes/classes.pptx
@@ -304,7 +304,7 @@
           <a:p>
             <a:fld id="{A0F86979-30DA-49EE-A740-32EBA6D2B7DE}" type="datetimeFigureOut">
               <a:rPr lang="en-SG" smtClean="0"/>
-              <a:t>29/8/2017</a:t>
+              <a:t>13/11/2017</a:t>
             </a:fld>
             <a:endParaRPr lang="en-SG"/>
           </a:p>
@@ -474,7 +474,7 @@
           <a:p>
             <a:fld id="{A0F86979-30DA-49EE-A740-32EBA6D2B7DE}" type="datetimeFigureOut">
               <a:rPr lang="en-SG" smtClean="0"/>
-              <a:t>29/8/2017</a:t>
+              <a:t>13/11/2017</a:t>
             </a:fld>
             <a:endParaRPr lang="en-SG"/>
           </a:p>
@@ -654,7 +654,7 @@
           <a:p>
             <a:fld id="{A0F86979-30DA-49EE-A740-32EBA6D2B7DE}" type="datetimeFigureOut">
               <a:rPr lang="en-SG" smtClean="0"/>
-              <a:t>29/8/2017</a:t>
+              <a:t>13/11/2017</a:t>
             </a:fld>
             <a:endParaRPr lang="en-SG"/>
           </a:p>
@@ -824,7 +824,7 @@
           <a:p>
             <a:fld id="{A0F86979-30DA-49EE-A740-32EBA6D2B7DE}" type="datetimeFigureOut">
               <a:rPr lang="en-SG" smtClean="0"/>
-              <a:t>29/8/2017</a:t>
+              <a:t>13/11/2017</a:t>
             </a:fld>
             <a:endParaRPr lang="en-SG"/>
           </a:p>
@@ -1070,7 +1070,7 @@
           <a:p>
             <a:fld id="{A0F86979-30DA-49EE-A740-32EBA6D2B7DE}" type="datetimeFigureOut">
               <a:rPr lang="en-SG" smtClean="0"/>
-              <a:t>29/8/2017</a:t>
+              <a:t>13/11/2017</a:t>
             </a:fld>
             <a:endParaRPr lang="en-SG"/>
           </a:p>
@@ -1358,7 +1358,7 @@
           <a:p>
             <a:fld id="{A0F86979-30DA-49EE-A740-32EBA6D2B7DE}" type="datetimeFigureOut">
               <a:rPr lang="en-SG" smtClean="0"/>
-              <a:t>29/8/2017</a:t>
+              <a:t>13/11/2017</a:t>
             </a:fld>
             <a:endParaRPr lang="en-SG"/>
           </a:p>
@@ -1780,7 +1780,7 @@
           <a:p>
             <a:fld id="{A0F86979-30DA-49EE-A740-32EBA6D2B7DE}" type="datetimeFigureOut">
               <a:rPr lang="en-SG" smtClean="0"/>
-              <a:t>29/8/2017</a:t>
+              <a:t>13/11/2017</a:t>
             </a:fld>
             <a:endParaRPr lang="en-SG"/>
           </a:p>
@@ -1898,7 +1898,7 @@
           <a:p>
             <a:fld id="{A0F86979-30DA-49EE-A740-32EBA6D2B7DE}" type="datetimeFigureOut">
               <a:rPr lang="en-SG" smtClean="0"/>
-              <a:t>29/8/2017</a:t>
+              <a:t>13/11/2017</a:t>
             </a:fld>
             <a:endParaRPr lang="en-SG"/>
           </a:p>
@@ -1993,7 +1993,7 @@
           <a:p>
             <a:fld id="{A0F86979-30DA-49EE-A740-32EBA6D2B7DE}" type="datetimeFigureOut">
               <a:rPr lang="en-SG" smtClean="0"/>
-              <a:t>29/8/2017</a:t>
+              <a:t>13/11/2017</a:t>
             </a:fld>
             <a:endParaRPr lang="en-SG"/>
           </a:p>
@@ -2270,7 +2270,7 @@
           <a:p>
             <a:fld id="{A0F86979-30DA-49EE-A740-32EBA6D2B7DE}" type="datetimeFigureOut">
               <a:rPr lang="en-SG" smtClean="0"/>
-              <a:t>29/8/2017</a:t>
+              <a:t>13/11/2017</a:t>
             </a:fld>
             <a:endParaRPr lang="en-SG"/>
           </a:p>
@@ -2523,7 +2523,7 @@
           <a:p>
             <a:fld id="{A0F86979-30DA-49EE-A740-32EBA6D2B7DE}" type="datetimeFigureOut">
               <a:rPr lang="en-SG" smtClean="0"/>
-              <a:t>29/8/2017</a:t>
+              <a:t>13/11/2017</a:t>
             </a:fld>
             <a:endParaRPr lang="en-SG"/>
           </a:p>
@@ -2736,7 +2736,7 @@
           <a:p>
             <a:fld id="{A0F86979-30DA-49EE-A740-32EBA6D2B7DE}" type="datetimeFigureOut">
               <a:rPr lang="en-SG" smtClean="0"/>
-              <a:t>29/8/2017</a:t>
+              <a:t>13/11/2017</a:t>
             </a:fld>
             <a:endParaRPr lang="en-SG"/>
           </a:p>
@@ -3111,6 +3111,173 @@
           <a:chExt cx="0" cy="0"/>
         </a:xfrm>
       </p:grpSpPr>
+      <p:grpSp>
+        <p:nvGrpSpPr>
+          <p:cNvPr id="55" name="x"/>
+          <p:cNvGrpSpPr>
+            <a:grpSpLocks noChangeAspect="1"/>
+          </p:cNvGrpSpPr>
+          <p:nvPr/>
+        </p:nvGrpSpPr>
+        <p:grpSpPr>
+          <a:xfrm>
+            <a:off x="9139291" y="2699904"/>
+            <a:ext cx="351291" cy="351291"/>
+            <a:chOff x="5562600" y="1371600"/>
+            <a:chExt cx="738443" cy="738443"/>
+          </a:xfrm>
+        </p:grpSpPr>
+        <p:sp>
+          <p:nvSpPr>
+            <p:cNvPr id="56" name="Flowchart: Connector 55"/>
+            <p:cNvSpPr/>
+            <p:nvPr/>
+          </p:nvSpPr>
+          <p:spPr>
+            <a:xfrm>
+              <a:off x="5562600" y="1371600"/>
+              <a:ext cx="738443" cy="738443"/>
+            </a:xfrm>
+            <a:prstGeom prst="flowChartConnector">
+              <a:avLst/>
+            </a:prstGeom>
+            <a:solidFill>
+              <a:schemeClr val="bg1"/>
+            </a:solidFill>
+            <a:ln>
+              <a:noFill/>
+            </a:ln>
+          </p:spPr>
+          <p:style>
+            <a:lnRef idx="2">
+              <a:schemeClr val="accent1">
+                <a:shade val="50000"/>
+              </a:schemeClr>
+            </a:lnRef>
+            <a:fillRef idx="1">
+              <a:schemeClr val="accent1"/>
+            </a:fillRef>
+            <a:effectRef idx="0">
+              <a:schemeClr val="accent1"/>
+            </a:effectRef>
+            <a:fontRef idx="minor">
+              <a:schemeClr val="lt1"/>
+            </a:fontRef>
+          </p:style>
+          <p:txBody>
+            <a:bodyPr rtlCol="0" anchor="ctr"/>
+            <a:lstStyle/>
+            <a:p>
+              <a:pPr algn="ctr"/>
+              <a:endParaRPr lang="en-SG">
+                <a:solidFill>
+                  <a:schemeClr val="tx1"/>
+                </a:solidFill>
+              </a:endParaRPr>
+            </a:p>
+          </p:txBody>
+        </p:sp>
+        <p:sp>
+          <p:nvSpPr>
+            <p:cNvPr id="57" name="Donut 56"/>
+            <p:cNvSpPr/>
+            <p:nvPr/>
+          </p:nvSpPr>
+          <p:spPr>
+            <a:xfrm>
+              <a:off x="5562600" y="1371600"/>
+              <a:ext cx="738443" cy="738443"/>
+            </a:xfrm>
+            <a:prstGeom prst="donut">
+              <a:avLst>
+                <a:gd name="adj" fmla="val 13134"/>
+              </a:avLst>
+            </a:prstGeom>
+            <a:solidFill>
+              <a:srgbClr val="C00000"/>
+            </a:solidFill>
+            <a:ln>
+              <a:noFill/>
+            </a:ln>
+          </p:spPr>
+          <p:style>
+            <a:lnRef idx="2">
+              <a:schemeClr val="accent1">
+                <a:shade val="50000"/>
+              </a:schemeClr>
+            </a:lnRef>
+            <a:fillRef idx="1">
+              <a:schemeClr val="accent1"/>
+            </a:fillRef>
+            <a:effectRef idx="0">
+              <a:schemeClr val="accent1"/>
+            </a:effectRef>
+            <a:fontRef idx="minor">
+              <a:schemeClr val="lt1"/>
+            </a:fontRef>
+          </p:style>
+          <p:txBody>
+            <a:bodyPr rtlCol="0" anchor="ctr"/>
+            <a:lstStyle/>
+            <a:p>
+              <a:pPr algn="ctr"/>
+              <a:endParaRPr lang="en-SG">
+                <a:solidFill>
+                  <a:schemeClr val="tx1"/>
+                </a:solidFill>
+              </a:endParaRPr>
+            </a:p>
+          </p:txBody>
+        </p:sp>
+        <p:sp>
+          <p:nvSpPr>
+            <p:cNvPr id="58" name="Cross 57"/>
+            <p:cNvSpPr/>
+            <p:nvPr/>
+          </p:nvSpPr>
+          <p:spPr>
+            <a:xfrm rot="2492112">
+              <a:off x="5747417" y="1548369"/>
+              <a:ext cx="368808" cy="368808"/>
+            </a:xfrm>
+            <a:prstGeom prst="plus">
+              <a:avLst>
+                <a:gd name="adj" fmla="val 35417"/>
+              </a:avLst>
+            </a:prstGeom>
+            <a:solidFill>
+              <a:srgbClr val="C00000"/>
+            </a:solidFill>
+            <a:ln>
+              <a:noFill/>
+            </a:ln>
+          </p:spPr>
+          <p:style>
+            <a:lnRef idx="2">
+              <a:schemeClr val="accent1">
+                <a:shade val="50000"/>
+              </a:schemeClr>
+            </a:lnRef>
+            <a:fillRef idx="1">
+              <a:schemeClr val="accent1"/>
+            </a:fillRef>
+            <a:effectRef idx="0">
+              <a:schemeClr val="accent1"/>
+            </a:effectRef>
+            <a:fontRef idx="minor">
+              <a:schemeClr val="lt1"/>
+            </a:fontRef>
+          </p:style>
+          <p:txBody>
+            <a:bodyPr rtlCol="0" anchor="ctr"/>
+            <a:lstStyle/>
+            <a:p>
+              <a:pPr algn="ctr"/>
+              <a:endParaRPr lang="en-SG"/>
+            </a:p>
+          </p:txBody>
+        </p:sp>
+      </p:grpSp>
       <p:grpSp>
         <p:nvGrpSpPr>
           <p:cNvPr id="162" name="Group 161"/>
@@ -5034,6 +5201,1041 @@
           </p:txBody>
         </p:sp>
       </p:grpSp>
+      <p:grpSp>
+        <p:nvGrpSpPr>
+          <p:cNvPr id="42" name="Group 41"/>
+          <p:cNvGrpSpPr/>
+          <p:nvPr/>
+        </p:nvGrpSpPr>
+        <p:grpSpPr>
+          <a:xfrm>
+            <a:off x="8624196" y="3280314"/>
+            <a:ext cx="1371600" cy="1102886"/>
+            <a:chOff x="6629400" y="4857492"/>
+            <a:chExt cx="1371600" cy="1102886"/>
+          </a:xfrm>
+          <a:effectLst>
+            <a:outerShdw blurRad="63500" sx="102000" sy="102000" algn="ctr" rotWithShape="0">
+              <a:prstClr val="black">
+                <a:alpha val="40000"/>
+              </a:prstClr>
+            </a:outerShdw>
+          </a:effectLst>
+        </p:grpSpPr>
+        <p:sp>
+          <p:nvSpPr>
+            <p:cNvPr id="43" name="Rectangle 42"/>
+            <p:cNvSpPr/>
+            <p:nvPr/>
+          </p:nvSpPr>
+          <p:spPr>
+            <a:xfrm>
+              <a:off x="6629400" y="4857492"/>
+              <a:ext cx="1371600" cy="369332"/>
+            </a:xfrm>
+            <a:prstGeom prst="rect">
+              <a:avLst/>
+            </a:prstGeom>
+            <a:solidFill>
+              <a:schemeClr val="bg1"/>
+            </a:solidFill>
+            <a:ln>
+              <a:solidFill>
+                <a:schemeClr val="tx1"/>
+              </a:solidFill>
+            </a:ln>
+            <a:effectLst/>
+          </p:spPr>
+          <p:style>
+            <a:lnRef idx="1">
+              <a:schemeClr val="accent4"/>
+            </a:lnRef>
+            <a:fillRef idx="2">
+              <a:schemeClr val="accent4"/>
+            </a:fillRef>
+            <a:effectRef idx="1">
+              <a:schemeClr val="accent4"/>
+            </a:effectRef>
+            <a:fontRef idx="minor">
+              <a:schemeClr val="dk1"/>
+            </a:fontRef>
+          </p:style>
+          <p:txBody>
+            <a:bodyPr wrap="square" rtlCol="0" anchor="ctr">
+              <a:spAutoFit/>
+            </a:bodyPr>
+            <a:lstStyle/>
+            <a:p>
+              <a:pPr algn="ctr"/>
+              <a:r>
+                <a:rPr lang="en-US" dirty="0" smtClean="0">
+                  <a:solidFill>
+                    <a:schemeClr val="tx1"/>
+                  </a:solidFill>
+                </a:rPr>
+                <a:t>Class </a:t>
+              </a:r>
+              <a:r>
+                <a:rPr lang="en-US" dirty="0" smtClean="0">
+                  <a:solidFill>
+                    <a:schemeClr val="tx1"/>
+                  </a:solidFill>
+                </a:rPr>
+                <a:t>F</a:t>
+              </a:r>
+              <a:endParaRPr lang="en-US" dirty="0">
+                <a:solidFill>
+                  <a:schemeClr val="tx1"/>
+                </a:solidFill>
+              </a:endParaRPr>
+            </a:p>
+          </p:txBody>
+        </p:sp>
+        <p:sp>
+          <p:nvSpPr>
+            <p:cNvPr id="44" name="Rectangle 43"/>
+            <p:cNvSpPr/>
+            <p:nvPr/>
+          </p:nvSpPr>
+          <p:spPr>
+            <a:xfrm>
+              <a:off x="6629400" y="5224269"/>
+              <a:ext cx="1371600" cy="369332"/>
+            </a:xfrm>
+            <a:prstGeom prst="rect">
+              <a:avLst/>
+            </a:prstGeom>
+            <a:solidFill>
+              <a:schemeClr val="bg1"/>
+            </a:solidFill>
+            <a:ln>
+              <a:solidFill>
+                <a:schemeClr val="tx1"/>
+              </a:solidFill>
+            </a:ln>
+            <a:effectLst/>
+          </p:spPr>
+          <p:style>
+            <a:lnRef idx="1">
+              <a:schemeClr val="accent4"/>
+            </a:lnRef>
+            <a:fillRef idx="2">
+              <a:schemeClr val="accent4"/>
+            </a:fillRef>
+            <a:effectRef idx="1">
+              <a:schemeClr val="accent4"/>
+            </a:effectRef>
+            <a:fontRef idx="minor">
+              <a:schemeClr val="dk1"/>
+            </a:fontRef>
+          </p:style>
+          <p:txBody>
+            <a:bodyPr wrap="square" rtlCol="0" anchor="ctr">
+              <a:spAutoFit/>
+            </a:bodyPr>
+            <a:lstStyle/>
+            <a:p>
+              <a:r>
+                <a:rPr lang="en-US" dirty="0" smtClean="0">
+                  <a:solidFill>
+                    <a:schemeClr val="tx1"/>
+                  </a:solidFill>
+                </a:rPr>
+                <a:t>Operations</a:t>
+              </a:r>
+              <a:endParaRPr lang="en-US" dirty="0">
+                <a:solidFill>
+                  <a:schemeClr val="tx1"/>
+                </a:solidFill>
+              </a:endParaRPr>
+            </a:p>
+          </p:txBody>
+        </p:sp>
+        <p:sp>
+          <p:nvSpPr>
+            <p:cNvPr id="59" name="Rectangle 58"/>
+            <p:cNvSpPr/>
+            <p:nvPr/>
+          </p:nvSpPr>
+          <p:spPr>
+            <a:xfrm>
+              <a:off x="6629400" y="5591046"/>
+              <a:ext cx="1371600" cy="369332"/>
+            </a:xfrm>
+            <a:prstGeom prst="rect">
+              <a:avLst/>
+            </a:prstGeom>
+            <a:solidFill>
+              <a:schemeClr val="bg1"/>
+            </a:solidFill>
+            <a:ln>
+              <a:solidFill>
+                <a:schemeClr val="tx1"/>
+              </a:solidFill>
+            </a:ln>
+            <a:effectLst/>
+          </p:spPr>
+          <p:style>
+            <a:lnRef idx="1">
+              <a:schemeClr val="accent4"/>
+            </a:lnRef>
+            <a:fillRef idx="2">
+              <a:schemeClr val="accent4"/>
+            </a:fillRef>
+            <a:effectRef idx="1">
+              <a:schemeClr val="accent4"/>
+            </a:effectRef>
+            <a:fontRef idx="minor">
+              <a:schemeClr val="dk1"/>
+            </a:fontRef>
+          </p:style>
+          <p:txBody>
+            <a:bodyPr wrap="square" rtlCol="0" anchor="ctr">
+              <a:spAutoFit/>
+            </a:bodyPr>
+            <a:lstStyle/>
+            <a:p>
+              <a:r>
+                <a:rPr lang="en-US" dirty="0" smtClean="0">
+                  <a:solidFill>
+                    <a:schemeClr val="tx1"/>
+                  </a:solidFill>
+                </a:rPr>
+                <a:t>Attributes</a:t>
+              </a:r>
+              <a:endParaRPr lang="en-US" dirty="0">
+                <a:solidFill>
+                  <a:schemeClr val="tx1"/>
+                </a:solidFill>
+              </a:endParaRPr>
+            </a:p>
+          </p:txBody>
+        </p:sp>
+      </p:grpSp>
+      <p:grpSp>
+        <p:nvGrpSpPr>
+          <p:cNvPr id="60" name="x"/>
+          <p:cNvGrpSpPr>
+            <a:grpSpLocks noChangeAspect="1"/>
+          </p:cNvGrpSpPr>
+          <p:nvPr/>
+        </p:nvGrpSpPr>
+        <p:grpSpPr>
+          <a:xfrm>
+            <a:off x="10768240" y="2699904"/>
+            <a:ext cx="351291" cy="351291"/>
+            <a:chOff x="5562600" y="1371600"/>
+            <a:chExt cx="738443" cy="738443"/>
+          </a:xfrm>
+        </p:grpSpPr>
+        <p:sp>
+          <p:nvSpPr>
+            <p:cNvPr id="61" name="Flowchart: Connector 60"/>
+            <p:cNvSpPr/>
+            <p:nvPr/>
+          </p:nvSpPr>
+          <p:spPr>
+            <a:xfrm>
+              <a:off x="5562600" y="1371600"/>
+              <a:ext cx="738443" cy="738443"/>
+            </a:xfrm>
+            <a:prstGeom prst="flowChartConnector">
+              <a:avLst/>
+            </a:prstGeom>
+            <a:solidFill>
+              <a:schemeClr val="bg1"/>
+            </a:solidFill>
+            <a:ln>
+              <a:noFill/>
+            </a:ln>
+          </p:spPr>
+          <p:style>
+            <a:lnRef idx="2">
+              <a:schemeClr val="accent1">
+                <a:shade val="50000"/>
+              </a:schemeClr>
+            </a:lnRef>
+            <a:fillRef idx="1">
+              <a:schemeClr val="accent1"/>
+            </a:fillRef>
+            <a:effectRef idx="0">
+              <a:schemeClr val="accent1"/>
+            </a:effectRef>
+            <a:fontRef idx="minor">
+              <a:schemeClr val="lt1"/>
+            </a:fontRef>
+          </p:style>
+          <p:txBody>
+            <a:bodyPr rtlCol="0" anchor="ctr"/>
+            <a:lstStyle/>
+            <a:p>
+              <a:pPr algn="ctr"/>
+              <a:endParaRPr lang="en-SG">
+                <a:solidFill>
+                  <a:schemeClr val="tx1"/>
+                </a:solidFill>
+              </a:endParaRPr>
+            </a:p>
+          </p:txBody>
+        </p:sp>
+        <p:sp>
+          <p:nvSpPr>
+            <p:cNvPr id="62" name="Donut 61"/>
+            <p:cNvSpPr/>
+            <p:nvPr/>
+          </p:nvSpPr>
+          <p:spPr>
+            <a:xfrm>
+              <a:off x="5562600" y="1371600"/>
+              <a:ext cx="738443" cy="738443"/>
+            </a:xfrm>
+            <a:prstGeom prst="donut">
+              <a:avLst>
+                <a:gd name="adj" fmla="val 13134"/>
+              </a:avLst>
+            </a:prstGeom>
+            <a:solidFill>
+              <a:srgbClr val="C00000"/>
+            </a:solidFill>
+            <a:ln>
+              <a:noFill/>
+            </a:ln>
+          </p:spPr>
+          <p:style>
+            <a:lnRef idx="2">
+              <a:schemeClr val="accent1">
+                <a:shade val="50000"/>
+              </a:schemeClr>
+            </a:lnRef>
+            <a:fillRef idx="1">
+              <a:schemeClr val="accent1"/>
+            </a:fillRef>
+            <a:effectRef idx="0">
+              <a:schemeClr val="accent1"/>
+            </a:effectRef>
+            <a:fontRef idx="minor">
+              <a:schemeClr val="lt1"/>
+            </a:fontRef>
+          </p:style>
+          <p:txBody>
+            <a:bodyPr rtlCol="0" anchor="ctr"/>
+            <a:lstStyle/>
+            <a:p>
+              <a:pPr algn="ctr"/>
+              <a:endParaRPr lang="en-SG">
+                <a:solidFill>
+                  <a:schemeClr val="tx1"/>
+                </a:solidFill>
+              </a:endParaRPr>
+            </a:p>
+          </p:txBody>
+        </p:sp>
+        <p:sp>
+          <p:nvSpPr>
+            <p:cNvPr id="63" name="Cross 62"/>
+            <p:cNvSpPr/>
+            <p:nvPr/>
+          </p:nvSpPr>
+          <p:spPr>
+            <a:xfrm rot="2492112">
+              <a:off x="5747417" y="1548369"/>
+              <a:ext cx="368808" cy="368808"/>
+            </a:xfrm>
+            <a:prstGeom prst="plus">
+              <a:avLst>
+                <a:gd name="adj" fmla="val 35417"/>
+              </a:avLst>
+            </a:prstGeom>
+            <a:solidFill>
+              <a:srgbClr val="C00000"/>
+            </a:solidFill>
+            <a:ln>
+              <a:noFill/>
+            </a:ln>
+          </p:spPr>
+          <p:style>
+            <a:lnRef idx="2">
+              <a:schemeClr val="accent1">
+                <a:shade val="50000"/>
+              </a:schemeClr>
+            </a:lnRef>
+            <a:fillRef idx="1">
+              <a:schemeClr val="accent1"/>
+            </a:fillRef>
+            <a:effectRef idx="0">
+              <a:schemeClr val="accent1"/>
+            </a:effectRef>
+            <a:fontRef idx="minor">
+              <a:schemeClr val="lt1"/>
+            </a:fontRef>
+          </p:style>
+          <p:txBody>
+            <a:bodyPr rtlCol="0" anchor="ctr"/>
+            <a:lstStyle/>
+            <a:p>
+              <a:pPr algn="ctr"/>
+              <a:endParaRPr lang="en-SG"/>
+            </a:p>
+          </p:txBody>
+        </p:sp>
+      </p:grpSp>
+      <p:grpSp>
+        <p:nvGrpSpPr>
+          <p:cNvPr id="64" name="Group 63"/>
+          <p:cNvGrpSpPr/>
+          <p:nvPr/>
+        </p:nvGrpSpPr>
+        <p:grpSpPr>
+          <a:xfrm>
+            <a:off x="10253145" y="3280314"/>
+            <a:ext cx="1371600" cy="1102886"/>
+            <a:chOff x="6629400" y="4857492"/>
+            <a:chExt cx="1371600" cy="1102886"/>
+          </a:xfrm>
+          <a:effectLst>
+            <a:outerShdw blurRad="63500" sx="102000" sy="102000" algn="ctr" rotWithShape="0">
+              <a:prstClr val="black">
+                <a:alpha val="40000"/>
+              </a:prstClr>
+            </a:outerShdw>
+          </a:effectLst>
+        </p:grpSpPr>
+        <p:sp>
+          <p:nvSpPr>
+            <p:cNvPr id="65" name="Rectangle 64"/>
+            <p:cNvSpPr/>
+            <p:nvPr/>
+          </p:nvSpPr>
+          <p:spPr>
+            <a:xfrm>
+              <a:off x="6629400" y="4857492"/>
+              <a:ext cx="1371600" cy="369332"/>
+            </a:xfrm>
+            <a:prstGeom prst="rect">
+              <a:avLst/>
+            </a:prstGeom>
+            <a:solidFill>
+              <a:schemeClr val="bg1"/>
+            </a:solidFill>
+            <a:ln>
+              <a:solidFill>
+                <a:schemeClr val="tx1"/>
+              </a:solidFill>
+            </a:ln>
+            <a:effectLst/>
+          </p:spPr>
+          <p:style>
+            <a:lnRef idx="1">
+              <a:schemeClr val="accent4"/>
+            </a:lnRef>
+            <a:fillRef idx="2">
+              <a:schemeClr val="accent4"/>
+            </a:fillRef>
+            <a:effectRef idx="1">
+              <a:schemeClr val="accent4"/>
+            </a:effectRef>
+            <a:fontRef idx="minor">
+              <a:schemeClr val="dk1"/>
+            </a:fontRef>
+          </p:style>
+          <p:txBody>
+            <a:bodyPr wrap="square" rtlCol="0" anchor="ctr">
+              <a:spAutoFit/>
+            </a:bodyPr>
+            <a:lstStyle/>
+            <a:p>
+              <a:pPr algn="ctr"/>
+              <a:r>
+                <a:rPr lang="en-US" dirty="0" smtClean="0">
+                  <a:solidFill>
+                    <a:schemeClr val="tx1"/>
+                  </a:solidFill>
+                </a:rPr>
+                <a:t>Class </a:t>
+              </a:r>
+              <a:r>
+                <a:rPr lang="en-US" dirty="0">
+                  <a:solidFill>
+                    <a:schemeClr val="tx1"/>
+                  </a:solidFill>
+                </a:rPr>
+                <a:t>G</a:t>
+              </a:r>
+              <a:endParaRPr lang="en-US" dirty="0">
+                <a:solidFill>
+                  <a:schemeClr val="tx1"/>
+                </a:solidFill>
+              </a:endParaRPr>
+            </a:p>
+          </p:txBody>
+        </p:sp>
+        <p:sp>
+          <p:nvSpPr>
+            <p:cNvPr id="66" name="Rectangle 65"/>
+            <p:cNvSpPr/>
+            <p:nvPr/>
+          </p:nvSpPr>
+          <p:spPr>
+            <a:xfrm>
+              <a:off x="6629400" y="5224269"/>
+              <a:ext cx="1371600" cy="369332"/>
+            </a:xfrm>
+            <a:prstGeom prst="rect">
+              <a:avLst/>
+            </a:prstGeom>
+            <a:solidFill>
+              <a:schemeClr val="bg1"/>
+            </a:solidFill>
+            <a:ln>
+              <a:solidFill>
+                <a:schemeClr val="tx1"/>
+              </a:solidFill>
+            </a:ln>
+            <a:effectLst/>
+          </p:spPr>
+          <p:style>
+            <a:lnRef idx="1">
+              <a:schemeClr val="accent4"/>
+            </a:lnRef>
+            <a:fillRef idx="2">
+              <a:schemeClr val="accent4"/>
+            </a:fillRef>
+            <a:effectRef idx="1">
+              <a:schemeClr val="accent4"/>
+            </a:effectRef>
+            <a:fontRef idx="minor">
+              <a:schemeClr val="dk1"/>
+            </a:fontRef>
+          </p:style>
+          <p:txBody>
+            <a:bodyPr wrap="square" rtlCol="0" anchor="ctr">
+              <a:spAutoFit/>
+            </a:bodyPr>
+            <a:lstStyle/>
+            <a:p>
+              <a:r>
+                <a:rPr lang="en-US" dirty="0">
+                  <a:solidFill>
+                    <a:schemeClr val="tx1"/>
+                  </a:solidFill>
+                </a:rPr>
+                <a:t>o</a:t>
+              </a:r>
+              <a:r>
+                <a:rPr lang="en-US" dirty="0" smtClean="0">
+                  <a:solidFill>
+                    <a:schemeClr val="tx1"/>
+                  </a:solidFill>
+                </a:rPr>
+                <a:t>peration1</a:t>
+              </a:r>
+              <a:endParaRPr lang="en-US" dirty="0">
+                <a:solidFill>
+                  <a:schemeClr val="tx1"/>
+                </a:solidFill>
+              </a:endParaRPr>
+            </a:p>
+          </p:txBody>
+        </p:sp>
+        <p:sp>
+          <p:nvSpPr>
+            <p:cNvPr id="67" name="Rectangle 66"/>
+            <p:cNvSpPr/>
+            <p:nvPr/>
+          </p:nvSpPr>
+          <p:spPr>
+            <a:xfrm>
+              <a:off x="6629400" y="5591046"/>
+              <a:ext cx="1371600" cy="369332"/>
+            </a:xfrm>
+            <a:prstGeom prst="rect">
+              <a:avLst/>
+            </a:prstGeom>
+            <a:solidFill>
+              <a:schemeClr val="bg1"/>
+            </a:solidFill>
+            <a:ln>
+              <a:solidFill>
+                <a:schemeClr val="tx1"/>
+              </a:solidFill>
+            </a:ln>
+            <a:effectLst/>
+          </p:spPr>
+          <p:style>
+            <a:lnRef idx="1">
+              <a:schemeClr val="accent4"/>
+            </a:lnRef>
+            <a:fillRef idx="2">
+              <a:schemeClr val="accent4"/>
+            </a:fillRef>
+            <a:effectRef idx="1">
+              <a:schemeClr val="accent4"/>
+            </a:effectRef>
+            <a:fontRef idx="minor">
+              <a:schemeClr val="dk1"/>
+            </a:fontRef>
+          </p:style>
+          <p:txBody>
+            <a:bodyPr wrap="square" rtlCol="0" anchor="ctr">
+              <a:spAutoFit/>
+            </a:bodyPr>
+            <a:lstStyle/>
+            <a:p>
+              <a:r>
+                <a:rPr lang="en-US" dirty="0" smtClean="0">
+                  <a:solidFill>
+                    <a:schemeClr val="tx1"/>
+                  </a:solidFill>
+                </a:rPr>
+                <a:t>operation2</a:t>
+              </a:r>
+              <a:endParaRPr lang="en-US" dirty="0">
+                <a:solidFill>
+                  <a:schemeClr val="tx1"/>
+                </a:solidFill>
+              </a:endParaRPr>
+            </a:p>
+          </p:txBody>
+        </p:sp>
+      </p:grpSp>
+      <p:grpSp>
+        <p:nvGrpSpPr>
+          <p:cNvPr id="68" name="x"/>
+          <p:cNvGrpSpPr>
+            <a:grpSpLocks noChangeAspect="1"/>
+          </p:cNvGrpSpPr>
+          <p:nvPr/>
+        </p:nvGrpSpPr>
+        <p:grpSpPr>
+          <a:xfrm>
+            <a:off x="12325202" y="2699904"/>
+            <a:ext cx="351291" cy="351291"/>
+            <a:chOff x="5562600" y="1371600"/>
+            <a:chExt cx="738443" cy="738443"/>
+          </a:xfrm>
+        </p:grpSpPr>
+        <p:sp>
+          <p:nvSpPr>
+            <p:cNvPr id="69" name="Flowchart: Connector 68"/>
+            <p:cNvSpPr/>
+            <p:nvPr/>
+          </p:nvSpPr>
+          <p:spPr>
+            <a:xfrm>
+              <a:off x="5562600" y="1371600"/>
+              <a:ext cx="738443" cy="738443"/>
+            </a:xfrm>
+            <a:prstGeom prst="flowChartConnector">
+              <a:avLst/>
+            </a:prstGeom>
+            <a:solidFill>
+              <a:schemeClr val="bg1"/>
+            </a:solidFill>
+            <a:ln>
+              <a:noFill/>
+            </a:ln>
+          </p:spPr>
+          <p:style>
+            <a:lnRef idx="2">
+              <a:schemeClr val="accent1">
+                <a:shade val="50000"/>
+              </a:schemeClr>
+            </a:lnRef>
+            <a:fillRef idx="1">
+              <a:schemeClr val="accent1"/>
+            </a:fillRef>
+            <a:effectRef idx="0">
+              <a:schemeClr val="accent1"/>
+            </a:effectRef>
+            <a:fontRef idx="minor">
+              <a:schemeClr val="lt1"/>
+            </a:fontRef>
+          </p:style>
+          <p:txBody>
+            <a:bodyPr rtlCol="0" anchor="ctr"/>
+            <a:lstStyle/>
+            <a:p>
+              <a:pPr algn="ctr"/>
+              <a:endParaRPr lang="en-SG">
+                <a:solidFill>
+                  <a:schemeClr val="tx1"/>
+                </a:solidFill>
+              </a:endParaRPr>
+            </a:p>
+          </p:txBody>
+        </p:sp>
+        <p:sp>
+          <p:nvSpPr>
+            <p:cNvPr id="70" name="Donut 69"/>
+            <p:cNvSpPr/>
+            <p:nvPr/>
+          </p:nvSpPr>
+          <p:spPr>
+            <a:xfrm>
+              <a:off x="5562600" y="1371600"/>
+              <a:ext cx="738443" cy="738443"/>
+            </a:xfrm>
+            <a:prstGeom prst="donut">
+              <a:avLst>
+                <a:gd name="adj" fmla="val 13134"/>
+              </a:avLst>
+            </a:prstGeom>
+            <a:solidFill>
+              <a:srgbClr val="C00000"/>
+            </a:solidFill>
+            <a:ln>
+              <a:noFill/>
+            </a:ln>
+          </p:spPr>
+          <p:style>
+            <a:lnRef idx="2">
+              <a:schemeClr val="accent1">
+                <a:shade val="50000"/>
+              </a:schemeClr>
+            </a:lnRef>
+            <a:fillRef idx="1">
+              <a:schemeClr val="accent1"/>
+            </a:fillRef>
+            <a:effectRef idx="0">
+              <a:schemeClr val="accent1"/>
+            </a:effectRef>
+            <a:fontRef idx="minor">
+              <a:schemeClr val="lt1"/>
+            </a:fontRef>
+          </p:style>
+          <p:txBody>
+            <a:bodyPr rtlCol="0" anchor="ctr"/>
+            <a:lstStyle/>
+            <a:p>
+              <a:pPr algn="ctr"/>
+              <a:endParaRPr lang="en-SG">
+                <a:solidFill>
+                  <a:schemeClr val="tx1"/>
+                </a:solidFill>
+              </a:endParaRPr>
+            </a:p>
+          </p:txBody>
+        </p:sp>
+        <p:sp>
+          <p:nvSpPr>
+            <p:cNvPr id="71" name="Cross 70"/>
+            <p:cNvSpPr/>
+            <p:nvPr/>
+          </p:nvSpPr>
+          <p:spPr>
+            <a:xfrm rot="2492112">
+              <a:off x="5747417" y="1548369"/>
+              <a:ext cx="368808" cy="368808"/>
+            </a:xfrm>
+            <a:prstGeom prst="plus">
+              <a:avLst>
+                <a:gd name="adj" fmla="val 35417"/>
+              </a:avLst>
+            </a:prstGeom>
+            <a:solidFill>
+              <a:srgbClr val="C00000"/>
+            </a:solidFill>
+            <a:ln>
+              <a:noFill/>
+            </a:ln>
+          </p:spPr>
+          <p:style>
+            <a:lnRef idx="2">
+              <a:schemeClr val="accent1">
+                <a:shade val="50000"/>
+              </a:schemeClr>
+            </a:lnRef>
+            <a:fillRef idx="1">
+              <a:schemeClr val="accent1"/>
+            </a:fillRef>
+            <a:effectRef idx="0">
+              <a:schemeClr val="accent1"/>
+            </a:effectRef>
+            <a:fontRef idx="minor">
+              <a:schemeClr val="lt1"/>
+            </a:fontRef>
+          </p:style>
+          <p:txBody>
+            <a:bodyPr rtlCol="0" anchor="ctr"/>
+            <a:lstStyle/>
+            <a:p>
+              <a:pPr algn="ctr"/>
+              <a:endParaRPr lang="en-SG"/>
+            </a:p>
+          </p:txBody>
+        </p:sp>
+      </p:grpSp>
+      <p:grpSp>
+        <p:nvGrpSpPr>
+          <p:cNvPr id="72" name="Group 71"/>
+          <p:cNvGrpSpPr/>
+          <p:nvPr/>
+        </p:nvGrpSpPr>
+        <p:grpSpPr>
+          <a:xfrm>
+            <a:off x="11810107" y="3280314"/>
+            <a:ext cx="1371600" cy="1467108"/>
+            <a:chOff x="6629400" y="4857492"/>
+            <a:chExt cx="1371600" cy="1467108"/>
+          </a:xfrm>
+          <a:effectLst>
+            <a:outerShdw blurRad="63500" sx="102000" sy="102000" algn="ctr" rotWithShape="0">
+              <a:prstClr val="black">
+                <a:alpha val="40000"/>
+              </a:prstClr>
+            </a:outerShdw>
+          </a:effectLst>
+        </p:grpSpPr>
+        <p:sp>
+          <p:nvSpPr>
+            <p:cNvPr id="73" name="Rectangle 72"/>
+            <p:cNvSpPr/>
+            <p:nvPr/>
+          </p:nvSpPr>
+          <p:spPr>
+            <a:xfrm>
+              <a:off x="6629400" y="4857492"/>
+              <a:ext cx="1371600" cy="369332"/>
+            </a:xfrm>
+            <a:prstGeom prst="rect">
+              <a:avLst/>
+            </a:prstGeom>
+            <a:solidFill>
+              <a:schemeClr val="bg1"/>
+            </a:solidFill>
+            <a:ln>
+              <a:solidFill>
+                <a:schemeClr val="tx1"/>
+              </a:solidFill>
+            </a:ln>
+            <a:effectLst/>
+          </p:spPr>
+          <p:style>
+            <a:lnRef idx="1">
+              <a:schemeClr val="accent4"/>
+            </a:lnRef>
+            <a:fillRef idx="2">
+              <a:schemeClr val="accent4"/>
+            </a:fillRef>
+            <a:effectRef idx="1">
+              <a:schemeClr val="accent4"/>
+            </a:effectRef>
+            <a:fontRef idx="minor">
+              <a:schemeClr val="dk1"/>
+            </a:fontRef>
+          </p:style>
+          <p:txBody>
+            <a:bodyPr wrap="square" rtlCol="0" anchor="ctr">
+              <a:spAutoFit/>
+            </a:bodyPr>
+            <a:lstStyle/>
+            <a:p>
+              <a:pPr algn="ctr"/>
+              <a:r>
+                <a:rPr lang="en-US" dirty="0" smtClean="0">
+                  <a:solidFill>
+                    <a:schemeClr val="tx1"/>
+                  </a:solidFill>
+                </a:rPr>
+                <a:t>Class </a:t>
+              </a:r>
+              <a:r>
+                <a:rPr lang="en-US" dirty="0">
+                  <a:solidFill>
+                    <a:schemeClr val="tx1"/>
+                  </a:solidFill>
+                </a:rPr>
+                <a:t>G</a:t>
+              </a:r>
+              <a:endParaRPr lang="en-US" dirty="0">
+                <a:solidFill>
+                  <a:schemeClr val="tx1"/>
+                </a:solidFill>
+              </a:endParaRPr>
+            </a:p>
+          </p:txBody>
+        </p:sp>
+        <p:sp>
+          <p:nvSpPr>
+            <p:cNvPr id="74" name="Rectangle 73"/>
+            <p:cNvSpPr/>
+            <p:nvPr/>
+          </p:nvSpPr>
+          <p:spPr>
+            <a:xfrm>
+              <a:off x="6629400" y="5224269"/>
+              <a:ext cx="1371600" cy="369332"/>
+            </a:xfrm>
+            <a:prstGeom prst="rect">
+              <a:avLst/>
+            </a:prstGeom>
+            <a:solidFill>
+              <a:schemeClr val="bg1"/>
+            </a:solidFill>
+            <a:ln>
+              <a:solidFill>
+                <a:schemeClr val="tx1"/>
+              </a:solidFill>
+            </a:ln>
+            <a:effectLst/>
+          </p:spPr>
+          <p:style>
+            <a:lnRef idx="1">
+              <a:schemeClr val="accent4"/>
+            </a:lnRef>
+            <a:fillRef idx="2">
+              <a:schemeClr val="accent4"/>
+            </a:fillRef>
+            <a:effectRef idx="1">
+              <a:schemeClr val="accent4"/>
+            </a:effectRef>
+            <a:fontRef idx="minor">
+              <a:schemeClr val="dk1"/>
+            </a:fontRef>
+          </p:style>
+          <p:txBody>
+            <a:bodyPr wrap="square" rtlCol="0" anchor="ctr">
+              <a:spAutoFit/>
+            </a:bodyPr>
+            <a:lstStyle/>
+            <a:p>
+              <a:r>
+                <a:rPr lang="en-US" dirty="0" smtClean="0">
+                  <a:solidFill>
+                    <a:schemeClr val="tx1"/>
+                  </a:solidFill>
+                </a:rPr>
+                <a:t>attribute1</a:t>
+              </a:r>
+              <a:endParaRPr lang="en-US" dirty="0">
+                <a:solidFill>
+                  <a:schemeClr val="tx1"/>
+                </a:solidFill>
+              </a:endParaRPr>
+            </a:p>
+          </p:txBody>
+        </p:sp>
+        <p:sp>
+          <p:nvSpPr>
+            <p:cNvPr id="75" name="Rectangle 74"/>
+            <p:cNvSpPr/>
+            <p:nvPr/>
+          </p:nvSpPr>
+          <p:spPr>
+            <a:xfrm>
+              <a:off x="6629400" y="5591046"/>
+              <a:ext cx="1371600" cy="369332"/>
+            </a:xfrm>
+            <a:prstGeom prst="rect">
+              <a:avLst/>
+            </a:prstGeom>
+            <a:solidFill>
+              <a:schemeClr val="bg1"/>
+            </a:solidFill>
+            <a:ln>
+              <a:solidFill>
+                <a:schemeClr val="tx1"/>
+              </a:solidFill>
+            </a:ln>
+            <a:effectLst/>
+          </p:spPr>
+          <p:style>
+            <a:lnRef idx="1">
+              <a:schemeClr val="accent4"/>
+            </a:lnRef>
+            <a:fillRef idx="2">
+              <a:schemeClr val="accent4"/>
+            </a:fillRef>
+            <a:effectRef idx="1">
+              <a:schemeClr val="accent4"/>
+            </a:effectRef>
+            <a:fontRef idx="minor">
+              <a:schemeClr val="dk1"/>
+            </a:fontRef>
+          </p:style>
+          <p:txBody>
+            <a:bodyPr wrap="square" rtlCol="0" anchor="ctr">
+              <a:spAutoFit/>
+            </a:bodyPr>
+            <a:lstStyle/>
+            <a:p>
+              <a:r>
+                <a:rPr lang="en-US" dirty="0" smtClean="0">
+                  <a:solidFill>
+                    <a:schemeClr val="tx1"/>
+                  </a:solidFill>
+                </a:rPr>
+                <a:t>attribute2</a:t>
+              </a:r>
+              <a:endParaRPr lang="en-US" dirty="0">
+                <a:solidFill>
+                  <a:schemeClr val="tx1"/>
+                </a:solidFill>
+              </a:endParaRPr>
+            </a:p>
+          </p:txBody>
+        </p:sp>
+        <p:sp>
+          <p:nvSpPr>
+            <p:cNvPr id="76" name="Rectangle 75"/>
+            <p:cNvSpPr/>
+            <p:nvPr/>
+          </p:nvSpPr>
+          <p:spPr>
+            <a:xfrm>
+              <a:off x="6629400" y="5955268"/>
+              <a:ext cx="1371600" cy="369332"/>
+            </a:xfrm>
+            <a:prstGeom prst="rect">
+              <a:avLst/>
+            </a:prstGeom>
+            <a:solidFill>
+              <a:schemeClr val="bg1"/>
+            </a:solidFill>
+            <a:ln>
+              <a:solidFill>
+                <a:schemeClr val="tx1"/>
+              </a:solidFill>
+            </a:ln>
+            <a:effectLst/>
+          </p:spPr>
+          <p:style>
+            <a:lnRef idx="1">
+              <a:schemeClr val="accent4"/>
+            </a:lnRef>
+            <a:fillRef idx="2">
+              <a:schemeClr val="accent4"/>
+            </a:fillRef>
+            <a:effectRef idx="1">
+              <a:schemeClr val="accent4"/>
+            </a:effectRef>
+            <a:fontRef idx="minor">
+              <a:schemeClr val="dk1"/>
+            </a:fontRef>
+          </p:style>
+          <p:txBody>
+            <a:bodyPr wrap="square" rtlCol="0" anchor="ctr">
+              <a:spAutoFit/>
+            </a:bodyPr>
+            <a:lstStyle/>
+            <a:p>
+              <a:r>
+                <a:rPr lang="en-US" dirty="0" smtClean="0">
+                  <a:solidFill>
+                    <a:schemeClr val="tx1"/>
+                  </a:solidFill>
+                </a:rPr>
+                <a:t>attribute3</a:t>
+              </a:r>
+              <a:endParaRPr lang="en-US" dirty="0">
+                <a:solidFill>
+                  <a:schemeClr val="tx1"/>
+                </a:solidFill>
+              </a:endParaRPr>
+            </a:p>
+          </p:txBody>
+        </p:sp>
+      </p:grpSp>
     </p:spTree>
     <p:extLst>
       <p:ext uri="{BB962C8B-B14F-4D97-AF65-F5344CB8AC3E}">

</xml_diff>